<commit_message>
Adição de Personas e ajustes na apresentação
</commit_message>
<xml_diff>
--- a/Apresentação.pptx
+++ b/Apresentação.pptx
@@ -146,8 +146,400 @@
 <p1510:revInfo xmlns:a="http://schemas.openxmlformats.org/drawingml/2006/main" xmlns:r="http://schemas.openxmlformats.org/officeDocument/2006/relationships" xmlns:p1510="http://schemas.microsoft.com/office/powerpoint/2015/10/main">
   <p1510:revLst>
     <p1510:client id="{3AE669AA-28D1-2B46-9F64-C4D3F0F1D2E5}" v="126" dt="2021-06-29T01:40:48.930"/>
+    <p1510:client id="{91630B59-078F-45E7-BDC6-18BD8A2B9F09}" v="24" dt="2021-06-29T19:46:46.743"/>
   </p1510:revLst>
 </p1510:revInfo>
+</file>
+
+<file path=ppt/changesInfos/changesInfo1.xml><?xml version="1.0" encoding="utf-8"?>
+<pc:chgInfo xmlns:a="http://schemas.openxmlformats.org/drawingml/2006/main" xmlns:r="http://schemas.openxmlformats.org/officeDocument/2006/relationships" xmlns:ac="http://schemas.microsoft.com/office/drawing/2013/main/command" xmlns:pc="http://schemas.microsoft.com/office/powerpoint/2013/main/command">
+  <pc:docChgLst>
+    <pc:chgData name="Gustavo Lazarotto Schroeder" userId="9fac2260-2786-4836-be82-4f023857ab3a" providerId="ADAL" clId="{91630B59-078F-45E7-BDC6-18BD8A2B9F09}"/>
+    <pc:docChg chg="undo custSel modSld">
+      <pc:chgData name="Gustavo Lazarotto Schroeder" userId="9fac2260-2786-4836-be82-4f023857ab3a" providerId="ADAL" clId="{91630B59-078F-45E7-BDC6-18BD8A2B9F09}" dt="2021-06-29T19:46:46.743" v="106"/>
+      <pc:docMkLst>
+        <pc:docMk/>
+      </pc:docMkLst>
+      <pc:sldChg chg="modTransition">
+        <pc:chgData name="Gustavo Lazarotto Schroeder" userId="9fac2260-2786-4836-be82-4f023857ab3a" providerId="ADAL" clId="{91630B59-078F-45E7-BDC6-18BD8A2B9F09}" dt="2021-06-29T19:46:28.807" v="105"/>
+        <pc:sldMkLst>
+          <pc:docMk/>
+          <pc:sldMk cId="2880174055" sldId="286"/>
+        </pc:sldMkLst>
+      </pc:sldChg>
+      <pc:sldChg chg="addSp delSp modSp mod">
+        <pc:chgData name="Gustavo Lazarotto Schroeder" userId="9fac2260-2786-4836-be82-4f023857ab3a" providerId="ADAL" clId="{91630B59-078F-45E7-BDC6-18BD8A2B9F09}" dt="2021-06-29T19:16:04.253" v="104" actId="1076"/>
+        <pc:sldMkLst>
+          <pc:docMk/>
+          <pc:sldMk cId="950630439" sldId="289"/>
+        </pc:sldMkLst>
+        <pc:spChg chg="del mod">
+          <ac:chgData name="Gustavo Lazarotto Schroeder" userId="9fac2260-2786-4836-be82-4f023857ab3a" providerId="ADAL" clId="{91630B59-078F-45E7-BDC6-18BD8A2B9F09}" dt="2021-06-29T19:12:05.274" v="53" actId="478"/>
+          <ac:spMkLst>
+            <pc:docMk/>
+            <pc:sldMk cId="950630439" sldId="289"/>
+            <ac:spMk id="3" creationId="{CBE52EC6-5655-AC41-BFC6-219A701838F1}"/>
+          </ac:spMkLst>
+        </pc:spChg>
+        <pc:spChg chg="add del mod">
+          <ac:chgData name="Gustavo Lazarotto Schroeder" userId="9fac2260-2786-4836-be82-4f023857ab3a" providerId="ADAL" clId="{91630B59-078F-45E7-BDC6-18BD8A2B9F09}" dt="2021-06-29T19:12:06.878" v="55" actId="478"/>
+          <ac:spMkLst>
+            <pc:docMk/>
+            <pc:sldMk cId="950630439" sldId="289"/>
+            <ac:spMk id="5" creationId="{DF111295-A979-456E-A0B3-ED3C4189034D}"/>
+          </ac:spMkLst>
+        </pc:spChg>
+        <pc:spChg chg="add del mod">
+          <ac:chgData name="Gustavo Lazarotto Schroeder" userId="9fac2260-2786-4836-be82-4f023857ab3a" providerId="ADAL" clId="{91630B59-078F-45E7-BDC6-18BD8A2B9F09}" dt="2021-06-29T19:13:54.717" v="87" actId="478"/>
+          <ac:spMkLst>
+            <pc:docMk/>
+            <pc:sldMk cId="950630439" sldId="289"/>
+            <ac:spMk id="6" creationId="{234834FC-7E46-4117-BAFE-41C96237B8B7}"/>
+          </ac:spMkLst>
+        </pc:spChg>
+        <pc:picChg chg="add mod modCrop">
+          <ac:chgData name="Gustavo Lazarotto Schroeder" userId="9fac2260-2786-4836-be82-4f023857ab3a" providerId="ADAL" clId="{91630B59-078F-45E7-BDC6-18BD8A2B9F09}" dt="2021-06-29T19:16:04.253" v="104" actId="1076"/>
+          <ac:picMkLst>
+            <pc:docMk/>
+            <pc:sldMk cId="950630439" sldId="289"/>
+            <ac:picMk id="7" creationId="{3EF9CF5C-973E-4CBC-B5AE-143C2DBA04ED}"/>
+          </ac:picMkLst>
+        </pc:picChg>
+        <pc:picChg chg="add mod modCrop">
+          <ac:chgData name="Gustavo Lazarotto Schroeder" userId="9fac2260-2786-4836-be82-4f023857ab3a" providerId="ADAL" clId="{91630B59-078F-45E7-BDC6-18BD8A2B9F09}" dt="2021-06-29T19:16:03.071" v="103" actId="1076"/>
+          <ac:picMkLst>
+            <pc:docMk/>
+            <pc:sldMk cId="950630439" sldId="289"/>
+            <ac:picMk id="8" creationId="{8645A8B0-AC6F-4463-BA8A-66482FD96A85}"/>
+          </ac:picMkLst>
+        </pc:picChg>
+      </pc:sldChg>
+      <pc:sldChg chg="modTransition">
+        <pc:chgData name="Gustavo Lazarotto Schroeder" userId="9fac2260-2786-4836-be82-4f023857ab3a" providerId="ADAL" clId="{91630B59-078F-45E7-BDC6-18BD8A2B9F09}" dt="2021-06-29T19:46:46.743" v="106"/>
+        <pc:sldMkLst>
+          <pc:docMk/>
+          <pc:sldMk cId="2873162771" sldId="291"/>
+        </pc:sldMkLst>
+      </pc:sldChg>
+      <pc:sldChg chg="addSp delSp modSp mod">
+        <pc:chgData name="Gustavo Lazarotto Schroeder" userId="9fac2260-2786-4836-be82-4f023857ab3a" providerId="ADAL" clId="{91630B59-078F-45E7-BDC6-18BD8A2B9F09}" dt="2021-06-29T18:11:24.536" v="16" actId="27614"/>
+        <pc:sldMkLst>
+          <pc:docMk/>
+          <pc:sldMk cId="1558528727" sldId="292"/>
+        </pc:sldMkLst>
+        <pc:spChg chg="del">
+          <ac:chgData name="Gustavo Lazarotto Schroeder" userId="9fac2260-2786-4836-be82-4f023857ab3a" providerId="ADAL" clId="{91630B59-078F-45E7-BDC6-18BD8A2B9F09}" dt="2021-06-29T18:11:21.612" v="14" actId="26606"/>
+          <ac:spMkLst>
+            <pc:docMk/>
+            <pc:sldMk cId="1558528727" sldId="292"/>
+            <ac:spMk id="58" creationId="{8D06CE56-3881-4ADA-8CEF-D18B02C242A3}"/>
+          </ac:spMkLst>
+        </pc:spChg>
+        <pc:spChg chg="del">
+          <ac:chgData name="Gustavo Lazarotto Schroeder" userId="9fac2260-2786-4836-be82-4f023857ab3a" providerId="ADAL" clId="{91630B59-078F-45E7-BDC6-18BD8A2B9F09}" dt="2021-06-29T18:11:21.612" v="14" actId="26606"/>
+          <ac:spMkLst>
+            <pc:docMk/>
+            <pc:sldMk cId="1558528727" sldId="292"/>
+            <ac:spMk id="59" creationId="{79F3C543-62EC-4433-9C93-A2CD8764E9B4}"/>
+          </ac:spMkLst>
+        </pc:spChg>
+        <pc:spChg chg="del">
+          <ac:chgData name="Gustavo Lazarotto Schroeder" userId="9fac2260-2786-4836-be82-4f023857ab3a" providerId="ADAL" clId="{91630B59-078F-45E7-BDC6-18BD8A2B9F09}" dt="2021-06-29T18:11:21.612" v="14" actId="26606"/>
+          <ac:spMkLst>
+            <pc:docMk/>
+            <pc:sldMk cId="1558528727" sldId="292"/>
+            <ac:spMk id="60" creationId="{96646FC9-C66D-4EC7-8310-0DD4ACC49C6C}"/>
+          </ac:spMkLst>
+        </pc:spChg>
+        <pc:spChg chg="del">
+          <ac:chgData name="Gustavo Lazarotto Schroeder" userId="9fac2260-2786-4836-be82-4f023857ab3a" providerId="ADAL" clId="{91630B59-078F-45E7-BDC6-18BD8A2B9F09}" dt="2021-06-29T18:11:21.612" v="14" actId="26606"/>
+          <ac:spMkLst>
+            <pc:docMk/>
+            <pc:sldMk cId="1558528727" sldId="292"/>
+            <ac:spMk id="61" creationId="{A3473CF9-37EB-43E7-89EF-D2D1C53D1DAC}"/>
+          </ac:spMkLst>
+        </pc:spChg>
+        <pc:spChg chg="del">
+          <ac:chgData name="Gustavo Lazarotto Schroeder" userId="9fac2260-2786-4836-be82-4f023857ab3a" providerId="ADAL" clId="{91630B59-078F-45E7-BDC6-18BD8A2B9F09}" dt="2021-06-29T18:11:21.612" v="14" actId="26606"/>
+          <ac:spMkLst>
+            <pc:docMk/>
+            <pc:sldMk cId="1558528727" sldId="292"/>
+            <ac:spMk id="62" creationId="{586B4EF9-43BA-4655-A6FF-1D8E21574C95}"/>
+          </ac:spMkLst>
+        </pc:spChg>
+        <pc:spChg chg="add">
+          <ac:chgData name="Gustavo Lazarotto Schroeder" userId="9fac2260-2786-4836-be82-4f023857ab3a" providerId="ADAL" clId="{91630B59-078F-45E7-BDC6-18BD8A2B9F09}" dt="2021-06-29T18:11:21.612" v="14" actId="26606"/>
+          <ac:spMkLst>
+            <pc:docMk/>
+            <pc:sldMk cId="1558528727" sldId="292"/>
+            <ac:spMk id="67" creationId="{8D06CE56-3881-4ADA-8CEF-D18B02C242A3}"/>
+          </ac:spMkLst>
+        </pc:spChg>
+        <pc:spChg chg="add">
+          <ac:chgData name="Gustavo Lazarotto Schroeder" userId="9fac2260-2786-4836-be82-4f023857ab3a" providerId="ADAL" clId="{91630B59-078F-45E7-BDC6-18BD8A2B9F09}" dt="2021-06-29T18:11:21.612" v="14" actId="26606"/>
+          <ac:spMkLst>
+            <pc:docMk/>
+            <pc:sldMk cId="1558528727" sldId="292"/>
+            <ac:spMk id="69" creationId="{79F3C543-62EC-4433-9C93-A2CD8764E9B4}"/>
+          </ac:spMkLst>
+        </pc:spChg>
+        <pc:spChg chg="add">
+          <ac:chgData name="Gustavo Lazarotto Schroeder" userId="9fac2260-2786-4836-be82-4f023857ab3a" providerId="ADAL" clId="{91630B59-078F-45E7-BDC6-18BD8A2B9F09}" dt="2021-06-29T18:11:21.612" v="14" actId="26606"/>
+          <ac:spMkLst>
+            <pc:docMk/>
+            <pc:sldMk cId="1558528727" sldId="292"/>
+            <ac:spMk id="71" creationId="{96646FC9-C66D-4EC7-8310-0DD4ACC49C6C}"/>
+          </ac:spMkLst>
+        </pc:spChg>
+        <pc:spChg chg="add">
+          <ac:chgData name="Gustavo Lazarotto Schroeder" userId="9fac2260-2786-4836-be82-4f023857ab3a" providerId="ADAL" clId="{91630B59-078F-45E7-BDC6-18BD8A2B9F09}" dt="2021-06-29T18:11:21.612" v="14" actId="26606"/>
+          <ac:spMkLst>
+            <pc:docMk/>
+            <pc:sldMk cId="1558528727" sldId="292"/>
+            <ac:spMk id="73" creationId="{A3473CF9-37EB-43E7-89EF-D2D1C53D1DAC}"/>
+          </ac:spMkLst>
+        </pc:spChg>
+        <pc:spChg chg="add">
+          <ac:chgData name="Gustavo Lazarotto Schroeder" userId="9fac2260-2786-4836-be82-4f023857ab3a" providerId="ADAL" clId="{91630B59-078F-45E7-BDC6-18BD8A2B9F09}" dt="2021-06-29T18:11:21.612" v="14" actId="26606"/>
+          <ac:spMkLst>
+            <pc:docMk/>
+            <pc:sldMk cId="1558528727" sldId="292"/>
+            <ac:spMk id="75" creationId="{586B4EF9-43BA-4655-A6FF-1D8E21574C95}"/>
+          </ac:spMkLst>
+        </pc:spChg>
+        <pc:picChg chg="add del mod">
+          <ac:chgData name="Gustavo Lazarotto Schroeder" userId="9fac2260-2786-4836-be82-4f023857ab3a" providerId="ADAL" clId="{91630B59-078F-45E7-BDC6-18BD8A2B9F09}" dt="2021-06-29T18:10:59.902" v="5"/>
+          <ac:picMkLst>
+            <pc:docMk/>
+            <pc:sldMk cId="1558528727" sldId="292"/>
+            <ac:picMk id="3" creationId="{C083A6BD-1365-4AB2-A0E1-00BCCA41607B}"/>
+          </ac:picMkLst>
+        </pc:picChg>
+        <pc:picChg chg="add del">
+          <ac:chgData name="Gustavo Lazarotto Schroeder" userId="9fac2260-2786-4836-be82-4f023857ab3a" providerId="ADAL" clId="{91630B59-078F-45E7-BDC6-18BD8A2B9F09}" dt="2021-06-29T18:11:03.348" v="8" actId="478"/>
+          <ac:picMkLst>
+            <pc:docMk/>
+            <pc:sldMk cId="1558528727" sldId="292"/>
+            <ac:picMk id="4" creationId="{EF0CCF47-9089-5D41-A3D3-5C44F3D0F5E8}"/>
+          </ac:picMkLst>
+        </pc:picChg>
+        <pc:picChg chg="add del mod ord">
+          <ac:chgData name="Gustavo Lazarotto Schroeder" userId="9fac2260-2786-4836-be82-4f023857ab3a" providerId="ADAL" clId="{91630B59-078F-45E7-BDC6-18BD8A2B9F09}" dt="2021-06-29T18:11:24.536" v="16" actId="27614"/>
+          <ac:picMkLst>
+            <pc:docMk/>
+            <pc:sldMk cId="1558528727" sldId="292"/>
+            <ac:picMk id="5" creationId="{FB3A5CB2-139B-9348-B30D-293CC97FE5EA}"/>
+          </ac:picMkLst>
+        </pc:picChg>
+        <pc:picChg chg="add mod modCrop">
+          <ac:chgData name="Gustavo Lazarotto Schroeder" userId="9fac2260-2786-4836-be82-4f023857ab3a" providerId="ADAL" clId="{91630B59-078F-45E7-BDC6-18BD8A2B9F09}" dt="2021-06-29T18:11:24.356" v="15" actId="27614"/>
+          <ac:picMkLst>
+            <pc:docMk/>
+            <pc:sldMk cId="1558528727" sldId="292"/>
+            <ac:picMk id="6" creationId="{E706A626-ED17-4E8D-A497-09CD0CC70DE2}"/>
+          </ac:picMkLst>
+        </pc:picChg>
+      </pc:sldChg>
+      <pc:sldChg chg="addSp delSp modSp mod">
+        <pc:chgData name="Gustavo Lazarotto Schroeder" userId="9fac2260-2786-4836-be82-4f023857ab3a" providerId="ADAL" clId="{91630B59-078F-45E7-BDC6-18BD8A2B9F09}" dt="2021-06-29T18:12:17.437" v="18" actId="26606"/>
+        <pc:sldMkLst>
+          <pc:docMk/>
+          <pc:sldMk cId="185879209" sldId="294"/>
+        </pc:sldMkLst>
+        <pc:spChg chg="del">
+          <ac:chgData name="Gustavo Lazarotto Schroeder" userId="9fac2260-2786-4836-be82-4f023857ab3a" providerId="ADAL" clId="{91630B59-078F-45E7-BDC6-18BD8A2B9F09}" dt="2021-06-29T18:12:17.437" v="18" actId="26606"/>
+          <ac:spMkLst>
+            <pc:docMk/>
+            <pc:sldMk cId="185879209" sldId="294"/>
+            <ac:spMk id="36" creationId="{8D06CE56-3881-4ADA-8CEF-D18B02C242A3}"/>
+          </ac:spMkLst>
+        </pc:spChg>
+        <pc:spChg chg="del">
+          <ac:chgData name="Gustavo Lazarotto Schroeder" userId="9fac2260-2786-4836-be82-4f023857ab3a" providerId="ADAL" clId="{91630B59-078F-45E7-BDC6-18BD8A2B9F09}" dt="2021-06-29T18:12:17.437" v="18" actId="26606"/>
+          <ac:spMkLst>
+            <pc:docMk/>
+            <pc:sldMk cId="185879209" sldId="294"/>
+            <ac:spMk id="37" creationId="{79F3C543-62EC-4433-9C93-A2CD8764E9B4}"/>
+          </ac:spMkLst>
+        </pc:spChg>
+        <pc:spChg chg="del">
+          <ac:chgData name="Gustavo Lazarotto Schroeder" userId="9fac2260-2786-4836-be82-4f023857ab3a" providerId="ADAL" clId="{91630B59-078F-45E7-BDC6-18BD8A2B9F09}" dt="2021-06-29T18:12:17.437" v="18" actId="26606"/>
+          <ac:spMkLst>
+            <pc:docMk/>
+            <pc:sldMk cId="185879209" sldId="294"/>
+            <ac:spMk id="38" creationId="{0E2F58BF-12E5-4B5A-AD25-4DAAA2742A7B}"/>
+          </ac:spMkLst>
+        </pc:spChg>
+        <pc:spChg chg="del">
+          <ac:chgData name="Gustavo Lazarotto Schroeder" userId="9fac2260-2786-4836-be82-4f023857ab3a" providerId="ADAL" clId="{91630B59-078F-45E7-BDC6-18BD8A2B9F09}" dt="2021-06-29T18:12:17.437" v="18" actId="26606"/>
+          <ac:spMkLst>
+            <pc:docMk/>
+            <pc:sldMk cId="185879209" sldId="294"/>
+            <ac:spMk id="39" creationId="{AF2F604E-43BE-4DC3-B983-E071523364F8}"/>
+          </ac:spMkLst>
+        </pc:spChg>
+        <pc:spChg chg="del">
+          <ac:chgData name="Gustavo Lazarotto Schroeder" userId="9fac2260-2786-4836-be82-4f023857ab3a" providerId="ADAL" clId="{91630B59-078F-45E7-BDC6-18BD8A2B9F09}" dt="2021-06-29T18:12:17.437" v="18" actId="26606"/>
+          <ac:spMkLst>
+            <pc:docMk/>
+            <pc:sldMk cId="185879209" sldId="294"/>
+            <ac:spMk id="40" creationId="{08C9B587-E65E-4B52-B37C-ABEBB6E87928}"/>
+          </ac:spMkLst>
+        </pc:spChg>
+        <pc:spChg chg="add">
+          <ac:chgData name="Gustavo Lazarotto Schroeder" userId="9fac2260-2786-4836-be82-4f023857ab3a" providerId="ADAL" clId="{91630B59-078F-45E7-BDC6-18BD8A2B9F09}" dt="2021-06-29T18:12:17.437" v="18" actId="26606"/>
+          <ac:spMkLst>
+            <pc:docMk/>
+            <pc:sldMk cId="185879209" sldId="294"/>
+            <ac:spMk id="45" creationId="{8D06CE56-3881-4ADA-8CEF-D18B02C242A3}"/>
+          </ac:spMkLst>
+        </pc:spChg>
+        <pc:spChg chg="add">
+          <ac:chgData name="Gustavo Lazarotto Schroeder" userId="9fac2260-2786-4836-be82-4f023857ab3a" providerId="ADAL" clId="{91630B59-078F-45E7-BDC6-18BD8A2B9F09}" dt="2021-06-29T18:12:17.437" v="18" actId="26606"/>
+          <ac:spMkLst>
+            <pc:docMk/>
+            <pc:sldMk cId="185879209" sldId="294"/>
+            <ac:spMk id="47" creationId="{79F3C543-62EC-4433-9C93-A2CD8764E9B4}"/>
+          </ac:spMkLst>
+        </pc:spChg>
+        <pc:spChg chg="add">
+          <ac:chgData name="Gustavo Lazarotto Schroeder" userId="9fac2260-2786-4836-be82-4f023857ab3a" providerId="ADAL" clId="{91630B59-078F-45E7-BDC6-18BD8A2B9F09}" dt="2021-06-29T18:12:17.437" v="18" actId="26606"/>
+          <ac:spMkLst>
+            <pc:docMk/>
+            <pc:sldMk cId="185879209" sldId="294"/>
+            <ac:spMk id="49" creationId="{68AF5748-FED8-45BA-8631-26D1D10F3246}"/>
+          </ac:spMkLst>
+        </pc:spChg>
+        <pc:spChg chg="add">
+          <ac:chgData name="Gustavo Lazarotto Schroeder" userId="9fac2260-2786-4836-be82-4f023857ab3a" providerId="ADAL" clId="{91630B59-078F-45E7-BDC6-18BD8A2B9F09}" dt="2021-06-29T18:12:17.437" v="18" actId="26606"/>
+          <ac:spMkLst>
+            <pc:docMk/>
+            <pc:sldMk cId="185879209" sldId="294"/>
+            <ac:spMk id="51" creationId="{AF2F604E-43BE-4DC3-B983-E071523364F8}"/>
+          </ac:spMkLst>
+        </pc:spChg>
+        <pc:spChg chg="add">
+          <ac:chgData name="Gustavo Lazarotto Schroeder" userId="9fac2260-2786-4836-be82-4f023857ab3a" providerId="ADAL" clId="{91630B59-078F-45E7-BDC6-18BD8A2B9F09}" dt="2021-06-29T18:12:17.437" v="18" actId="26606"/>
+          <ac:spMkLst>
+            <pc:docMk/>
+            <pc:sldMk cId="185879209" sldId="294"/>
+            <ac:spMk id="53" creationId="{08C9B587-E65E-4B52-B37C-ABEBB6E87928}"/>
+          </ac:spMkLst>
+        </pc:spChg>
+        <pc:picChg chg="mod">
+          <ac:chgData name="Gustavo Lazarotto Schroeder" userId="9fac2260-2786-4836-be82-4f023857ab3a" providerId="ADAL" clId="{91630B59-078F-45E7-BDC6-18BD8A2B9F09}" dt="2021-06-29T18:12:17.437" v="18" actId="26606"/>
+          <ac:picMkLst>
+            <pc:docMk/>
+            <pc:sldMk cId="185879209" sldId="294"/>
+            <ac:picMk id="3" creationId="{5B3253A5-ED55-441D-B5DE-2A96B16EF18E}"/>
+          </ac:picMkLst>
+        </pc:picChg>
+        <pc:picChg chg="del">
+          <ac:chgData name="Gustavo Lazarotto Schroeder" userId="9fac2260-2786-4836-be82-4f023857ab3a" providerId="ADAL" clId="{91630B59-078F-45E7-BDC6-18BD8A2B9F09}" dt="2021-06-29T18:11:31.629" v="17" actId="478"/>
+          <ac:picMkLst>
+            <pc:docMk/>
+            <pc:sldMk cId="185879209" sldId="294"/>
+            <ac:picMk id="7" creationId="{CD5478AB-3DD2-DA43-A235-A273C09A2C88}"/>
+          </ac:picMkLst>
+        </pc:picChg>
+      </pc:sldChg>
+      <pc:sldChg chg="modSp mod">
+        <pc:chgData name="Gustavo Lazarotto Schroeder" userId="9fac2260-2786-4836-be82-4f023857ab3a" providerId="ADAL" clId="{91630B59-078F-45E7-BDC6-18BD8A2B9F09}" dt="2021-06-29T18:16:44.539" v="47" actId="20577"/>
+        <pc:sldMkLst>
+          <pc:docMk/>
+          <pc:sldMk cId="2913513496" sldId="297"/>
+        </pc:sldMkLst>
+        <pc:spChg chg="mod">
+          <ac:chgData name="Gustavo Lazarotto Schroeder" userId="9fac2260-2786-4836-be82-4f023857ab3a" providerId="ADAL" clId="{91630B59-078F-45E7-BDC6-18BD8A2B9F09}" dt="2021-06-29T18:16:44.539" v="47" actId="20577"/>
+          <ac:spMkLst>
+            <pc:docMk/>
+            <pc:sldMk cId="2913513496" sldId="297"/>
+            <ac:spMk id="7" creationId="{CB68D04A-15E7-584B-A836-7A3881161854}"/>
+          </ac:spMkLst>
+        </pc:spChg>
+        <pc:spChg chg="mod">
+          <ac:chgData name="Gustavo Lazarotto Schroeder" userId="9fac2260-2786-4836-be82-4f023857ab3a" providerId="ADAL" clId="{91630B59-078F-45E7-BDC6-18BD8A2B9F09}" dt="2021-06-29T18:12:42.031" v="19"/>
+          <ac:spMkLst>
+            <pc:docMk/>
+            <pc:sldMk cId="2913513496" sldId="297"/>
+            <ac:spMk id="11" creationId="{82C8D5A0-FDC6-4E4D-B58E-4A17538DA805}"/>
+          </ac:spMkLst>
+        </pc:spChg>
+      </pc:sldChg>
+      <pc:sldChg chg="addSp delSp modSp mod">
+        <pc:chgData name="Gustavo Lazarotto Schroeder" userId="9fac2260-2786-4836-be82-4f023857ab3a" providerId="ADAL" clId="{91630B59-078F-45E7-BDC6-18BD8A2B9F09}" dt="2021-06-29T18:17:21.079" v="51" actId="962"/>
+        <pc:sldMkLst>
+          <pc:docMk/>
+          <pc:sldMk cId="1059375724" sldId="298"/>
+        </pc:sldMkLst>
+        <pc:spChg chg="del">
+          <ac:chgData name="Gustavo Lazarotto Schroeder" userId="9fac2260-2786-4836-be82-4f023857ab3a" providerId="ADAL" clId="{91630B59-078F-45E7-BDC6-18BD8A2B9F09}" dt="2021-06-29T18:17:18.961" v="49" actId="26606"/>
+          <ac:spMkLst>
+            <pc:docMk/>
+            <pc:sldMk cId="1059375724" sldId="298"/>
+            <ac:spMk id="38" creationId="{726908CC-6AC4-4222-8250-B90B6072E8AC}"/>
+          </ac:spMkLst>
+        </pc:spChg>
+        <pc:spChg chg="del">
+          <ac:chgData name="Gustavo Lazarotto Schroeder" userId="9fac2260-2786-4836-be82-4f023857ab3a" providerId="ADAL" clId="{91630B59-078F-45E7-BDC6-18BD8A2B9F09}" dt="2021-06-29T18:17:18.961" v="49" actId="26606"/>
+          <ac:spMkLst>
+            <pc:docMk/>
+            <pc:sldMk cId="1059375724" sldId="298"/>
+            <ac:spMk id="45" creationId="{F2F606D8-696E-4B76-BB10-43672AA1475A}"/>
+          </ac:spMkLst>
+        </pc:spChg>
+        <pc:spChg chg="del">
+          <ac:chgData name="Gustavo Lazarotto Schroeder" userId="9fac2260-2786-4836-be82-4f023857ab3a" providerId="ADAL" clId="{91630B59-078F-45E7-BDC6-18BD8A2B9F09}" dt="2021-06-29T18:17:18.961" v="49" actId="26606"/>
+          <ac:spMkLst>
+            <pc:docMk/>
+            <pc:sldMk cId="1059375724" sldId="298"/>
+            <ac:spMk id="46" creationId="{3ABF1881-5AFD-48F9-979A-19EE2FE30A33}"/>
+          </ac:spMkLst>
+        </pc:spChg>
+        <pc:spChg chg="add">
+          <ac:chgData name="Gustavo Lazarotto Schroeder" userId="9fac2260-2786-4836-be82-4f023857ab3a" providerId="ADAL" clId="{91630B59-078F-45E7-BDC6-18BD8A2B9F09}" dt="2021-06-29T18:17:18.961" v="49" actId="26606"/>
+          <ac:spMkLst>
+            <pc:docMk/>
+            <pc:sldMk cId="1059375724" sldId="298"/>
+            <ac:spMk id="51" creationId="{726908CC-6AC4-4222-8250-B90B6072E8AC}"/>
+          </ac:spMkLst>
+        </pc:spChg>
+        <pc:spChg chg="add">
+          <ac:chgData name="Gustavo Lazarotto Schroeder" userId="9fac2260-2786-4836-be82-4f023857ab3a" providerId="ADAL" clId="{91630B59-078F-45E7-BDC6-18BD8A2B9F09}" dt="2021-06-29T18:17:18.961" v="49" actId="26606"/>
+          <ac:spMkLst>
+            <pc:docMk/>
+            <pc:sldMk cId="1059375724" sldId="298"/>
+            <ac:spMk id="53" creationId="{F2F606D8-696E-4B76-BB10-43672AA1475A}"/>
+          </ac:spMkLst>
+        </pc:spChg>
+        <pc:spChg chg="add">
+          <ac:chgData name="Gustavo Lazarotto Schroeder" userId="9fac2260-2786-4836-be82-4f023857ab3a" providerId="ADAL" clId="{91630B59-078F-45E7-BDC6-18BD8A2B9F09}" dt="2021-06-29T18:17:18.961" v="49" actId="26606"/>
+          <ac:spMkLst>
+            <pc:docMk/>
+            <pc:sldMk cId="1059375724" sldId="298"/>
+            <ac:spMk id="55" creationId="{3ABF1881-5AFD-48F9-979A-19EE2FE30A33}"/>
+          </ac:spMkLst>
+        </pc:spChg>
+        <pc:picChg chg="mod">
+          <ac:chgData name="Gustavo Lazarotto Schroeder" userId="9fac2260-2786-4836-be82-4f023857ab3a" providerId="ADAL" clId="{91630B59-078F-45E7-BDC6-18BD8A2B9F09}" dt="2021-06-29T18:17:21.079" v="51" actId="962"/>
+          <ac:picMkLst>
+            <pc:docMk/>
+            <pc:sldMk cId="1059375724" sldId="298"/>
+            <ac:picMk id="2" creationId="{CA64FD52-1643-4AB1-8025-9631C9AE238E}"/>
+          </ac:picMkLst>
+        </pc:picChg>
+        <pc:picChg chg="del">
+          <ac:chgData name="Gustavo Lazarotto Schroeder" userId="9fac2260-2786-4836-be82-4f023857ab3a" providerId="ADAL" clId="{91630B59-078F-45E7-BDC6-18BD8A2B9F09}" dt="2021-06-29T18:17:11.897" v="48" actId="478"/>
+          <ac:picMkLst>
+            <pc:docMk/>
+            <pc:sldMk cId="1059375724" sldId="298"/>
+            <ac:picMk id="48" creationId="{756B6ED1-269A-0148-807E-255F1FC6E6BD}"/>
+          </ac:picMkLst>
+        </pc:picChg>
+      </pc:sldChg>
+    </pc:docChg>
+  </pc:docChgLst>
+</pc:chgInfo>
 </file>
 
 <file path=ppt/diagrams/colors1.xml><?xml version="1.0" encoding="utf-8"?>
@@ -4604,8 +4996,8 @@
     <dgm:cxn modelId="{319B200D-E851-0D41-B3D8-C51867C843C1}" type="presOf" srcId="{3BE89D88-D579-4598-9F5E-B06CDCE4F10E}" destId="{4C3A69D2-2717-BF4F-88D0-042BC9E9E98E}" srcOrd="0" destOrd="0" presId="urn:microsoft.com/office/officeart/2008/layout/LinedList"/>
     <dgm:cxn modelId="{A6FFB111-B9FF-47E2-A509-EB6254F8A8D1}" srcId="{3BE89D88-D579-4598-9F5E-B06CDCE4F10E}" destId="{4DE7DE79-9EC3-49EB-BB6C-B0E28633C66D}" srcOrd="1" destOrd="0" parTransId="{3930E96C-6693-4CFE-B407-F4D4FCF6A778}" sibTransId="{745D65C0-390A-4E70-AA3F-BC517FC0B029}"/>
     <dgm:cxn modelId="{44EF6346-338D-AA44-B465-F03C9839F548}" type="presOf" srcId="{F76D31E7-A4F1-4BEA-BEF2-FDE3E23B976F}" destId="{9EEC75C4-FBF6-DD45-BC74-8CFAAD2F7F5A}" srcOrd="0" destOrd="0" presId="urn:microsoft.com/office/officeart/2008/layout/LinedList"/>
+    <dgm:cxn modelId="{9DB8CF69-41CF-486C-A272-E4B117CD35B3}" srcId="{3BE89D88-D579-4598-9F5E-B06CDCE4F10E}" destId="{49918369-43A1-4D39-BD44-5B9481D5F064}" srcOrd="2" destOrd="0" parTransId="{E8C9DC29-9772-49FB-B655-DE3A82D9D610}" sibTransId="{1F68BC6E-DA8E-47CE-805E-D22A4EB9151B}"/>
     <dgm:cxn modelId="{32BD2E4B-D069-4E9E-9494-BD96D19972CC}" srcId="{3BE89D88-D579-4598-9F5E-B06CDCE4F10E}" destId="{F76D31E7-A4F1-4BEA-BEF2-FDE3E23B976F}" srcOrd="4" destOrd="0" parTransId="{6F25E2D8-A688-45EA-B3FB-60133E90772B}" sibTransId="{21431B58-26C6-4A63-91CE-4BC5FEA88D1B}"/>
-    <dgm:cxn modelId="{9DB8CF69-41CF-486C-A272-E4B117CD35B3}" srcId="{3BE89D88-D579-4598-9F5E-B06CDCE4F10E}" destId="{49918369-43A1-4D39-BD44-5B9481D5F064}" srcOrd="2" destOrd="0" parTransId="{E8C9DC29-9772-49FB-B655-DE3A82D9D610}" sibTransId="{1F68BC6E-DA8E-47CE-805E-D22A4EB9151B}"/>
     <dgm:cxn modelId="{80054982-AFDF-9842-9E5C-A67E07618D8C}" type="presOf" srcId="{49918369-43A1-4D39-BD44-5B9481D5F064}" destId="{FA151DFC-C7D5-FB49-8B08-DC546204FF1C}" srcOrd="0" destOrd="0" presId="urn:microsoft.com/office/officeart/2008/layout/LinedList"/>
     <dgm:cxn modelId="{2E3EE2B1-7D3B-4EA3-AE30-E1A8D0155361}" srcId="{3BE89D88-D579-4598-9F5E-B06CDCE4F10E}" destId="{F8C01B4A-E8F0-409C-8432-C80FCCFD43AE}" srcOrd="0" destOrd="0" parTransId="{D011783D-6C4F-44D8-A197-2E2867BB5F5F}" sibTransId="{E690A52C-E1B0-442E-A59E-7F0F17E76320}"/>
     <dgm:cxn modelId="{586FDFBD-BC2F-EE4D-9597-7FEDD384B8AC}" type="presOf" srcId="{C2F54FD9-2F26-4012-AE1F-5C30E1D01A7B}" destId="{45B51091-8542-D543-82A4-B15C15C93A33}" srcOrd="0" destOrd="0" presId="urn:microsoft.com/office/officeart/2008/layout/LinedList"/>
@@ -15317,7 +15709,7 @@
           <a:p>
             <a:fld id="{95341971-6EB8-194E-BFE5-EF7F9C04335A}" type="datetimeFigureOut">
               <a:rPr lang="pt-BR" smtClean="0"/>
-              <a:t>28/06/2021</a:t>
+              <a:t>29/06/2021</a:t>
             </a:fld>
             <a:endParaRPr lang="pt-BR"/>
           </a:p>
@@ -15901,6 +16293,90 @@
           <a:p>
             <a:fld id="{523011CF-0181-A341-95B6-113DFBB7C104}" type="slidenum">
               <a:rPr lang="pt-BR" smtClean="0"/>
+              <a:t>18</a:t>
+            </a:fld>
+            <a:endParaRPr lang="pt-BR"/>
+          </a:p>
+        </p:txBody>
+      </p:sp>
+    </p:spTree>
+    <p:extLst>
+      <p:ext uri="{BB962C8B-B14F-4D97-AF65-F5344CB8AC3E}">
+        <p14:creationId xmlns:p14="http://schemas.microsoft.com/office/powerpoint/2010/main" val="970571993"/>
+      </p:ext>
+    </p:extLst>
+  </p:cSld>
+  <p:clrMapOvr>
+    <a:masterClrMapping/>
+  </p:clrMapOvr>
+</p:notes>
+</file>
+
+<file path=ppt/notesSlides/notesSlide13.xml><?xml version="1.0" encoding="utf-8"?>
+<p:notes xmlns:a="http://schemas.openxmlformats.org/drawingml/2006/main" xmlns:r="http://schemas.openxmlformats.org/officeDocument/2006/relationships" xmlns:p="http://schemas.openxmlformats.org/presentationml/2006/main">
+  <p:cSld>
+    <p:spTree>
+      <p:nvGrpSpPr>
+        <p:cNvPr id="1" name=""/>
+        <p:cNvGrpSpPr/>
+        <p:nvPr/>
+      </p:nvGrpSpPr>
+      <p:grpSpPr>
+        <a:xfrm>
+          <a:off x="0" y="0"/>
+          <a:ext cx="0" cy="0"/>
+          <a:chOff x="0" y="0"/>
+          <a:chExt cx="0" cy="0"/>
+        </a:xfrm>
+      </p:grpSpPr>
+      <p:sp>
+        <p:nvSpPr>
+          <p:cNvPr id="2" name="Espaço Reservado para Imagem de Slide 1"/>
+          <p:cNvSpPr>
+            <a:spLocks noGrp="1" noRot="1" noChangeAspect="1"/>
+          </p:cNvSpPr>
+          <p:nvPr>
+            <p:ph type="sldImg"/>
+          </p:nvPr>
+        </p:nvSpPr>
+        <p:spPr/>
+      </p:sp>
+      <p:sp>
+        <p:nvSpPr>
+          <p:cNvPr id="3" name="Espaço Reservado para Anotações 2"/>
+          <p:cNvSpPr>
+            <a:spLocks noGrp="1"/>
+          </p:cNvSpPr>
+          <p:nvPr>
+            <p:ph type="body" idx="1"/>
+          </p:nvPr>
+        </p:nvSpPr>
+        <p:spPr/>
+        <p:txBody>
+          <a:bodyPr/>
+          <a:lstStyle/>
+          <a:p>
+            <a:endParaRPr lang="pt-BR" dirty="0"/>
+          </a:p>
+        </p:txBody>
+      </p:sp>
+      <p:sp>
+        <p:nvSpPr>
+          <p:cNvPr id="4" name="Espaço Reservado para Número de Slide 3"/>
+          <p:cNvSpPr>
+            <a:spLocks noGrp="1"/>
+          </p:cNvSpPr>
+          <p:nvPr>
+            <p:ph type="sldNum" sz="quarter" idx="5"/>
+          </p:nvPr>
+        </p:nvSpPr>
+        <p:spPr/>
+        <p:txBody>
+          <a:bodyPr/>
+          <a:lstStyle/>
+          <a:p>
+            <a:fld id="{523011CF-0181-A341-95B6-113DFBB7C104}" type="slidenum">
+              <a:rPr lang="pt-BR" smtClean="0"/>
               <a:t>22</a:t>
             </a:fld>
             <a:endParaRPr lang="pt-BR"/>
@@ -15920,7 +16396,7 @@
 </p:notes>
 </file>
 
-<file path=ppt/notesSlides/notesSlide13.xml><?xml version="1.0" encoding="utf-8"?>
+<file path=ppt/notesSlides/notesSlide14.xml><?xml version="1.0" encoding="utf-8"?>
 <p:notes xmlns:a="http://schemas.openxmlformats.org/drawingml/2006/main" xmlns:r="http://schemas.openxmlformats.org/officeDocument/2006/relationships" xmlns:p="http://schemas.openxmlformats.org/presentationml/2006/main">
   <p:cSld>
     <p:spTree>
@@ -16004,7 +16480,7 @@
 </p:notes>
 </file>
 
-<file path=ppt/notesSlides/notesSlide14.xml><?xml version="1.0" encoding="utf-8"?>
+<file path=ppt/notesSlides/notesSlide15.xml><?xml version="1.0" encoding="utf-8"?>
 <p:notes xmlns:a="http://schemas.openxmlformats.org/drawingml/2006/main" xmlns:r="http://schemas.openxmlformats.org/officeDocument/2006/relationships" xmlns:p="http://schemas.openxmlformats.org/presentationml/2006/main">
   <p:cSld>
     <p:spTree>
@@ -16088,7 +16564,7 @@
 </p:notes>
 </file>
 
-<file path=ppt/notesSlides/notesSlide15.xml><?xml version="1.0" encoding="utf-8"?>
+<file path=ppt/notesSlides/notesSlide16.xml><?xml version="1.0" encoding="utf-8"?>
 <p:notes xmlns:a="http://schemas.openxmlformats.org/drawingml/2006/main" xmlns:r="http://schemas.openxmlformats.org/officeDocument/2006/relationships" xmlns:p="http://schemas.openxmlformats.org/presentationml/2006/main">
   <p:cSld>
     <p:spTree>
@@ -17012,7 +17488,7 @@
           <a:p>
             <a:fld id="{02AC24A9-CCB6-4F8D-B8DB-C2F3692CFA5A}" type="datetimeFigureOut">
               <a:rPr lang="en-US" smtClean="0"/>
-              <a:t>6/28/21</a:t>
+              <a:t>6/29/2021</a:t>
             </a:fld>
             <a:endParaRPr lang="en-US"/>
           </a:p>
@@ -17382,7 +17858,7 @@
           <a:p>
             <a:fld id="{02AC24A9-CCB6-4F8D-B8DB-C2F3692CFA5A}" type="datetimeFigureOut">
               <a:rPr lang="en-US" smtClean="0"/>
-              <a:t>6/28/21</a:t>
+              <a:t>6/29/2021</a:t>
             </a:fld>
             <a:endParaRPr lang="en-US"/>
           </a:p>
@@ -17591,7 +18067,7 @@
           <a:p>
             <a:fld id="{02AC24A9-CCB6-4F8D-B8DB-C2F3692CFA5A}" type="datetimeFigureOut">
               <a:rPr lang="en-US" smtClean="0"/>
-              <a:t>6/28/21</a:t>
+              <a:t>6/29/2021</a:t>
             </a:fld>
             <a:endParaRPr lang="en-US"/>
           </a:p>
@@ -18061,7 +18537,7 @@
           <a:p>
             <a:fld id="{02AC24A9-CCB6-4F8D-B8DB-C2F3692CFA5A}" type="datetimeFigureOut">
               <a:rPr lang="en-US" smtClean="0"/>
-              <a:t>6/28/21</a:t>
+              <a:t>6/29/2021</a:t>
             </a:fld>
             <a:endParaRPr lang="en-US"/>
           </a:p>
@@ -18515,7 +18991,7 @@
           <a:p>
             <a:fld id="{02AC24A9-CCB6-4F8D-B8DB-C2F3692CFA5A}" type="datetimeFigureOut">
               <a:rPr lang="en-US" smtClean="0"/>
-              <a:t>6/28/21</a:t>
+              <a:t>6/29/2021</a:t>
             </a:fld>
             <a:endParaRPr lang="en-US"/>
           </a:p>
@@ -19047,7 +19523,7 @@
           <a:p>
             <a:fld id="{02AC24A9-CCB6-4F8D-B8DB-C2F3692CFA5A}" type="datetimeFigureOut">
               <a:rPr lang="en-US" smtClean="0"/>
-              <a:t>6/28/21</a:t>
+              <a:t>6/29/2021</a:t>
             </a:fld>
             <a:endParaRPr lang="en-US"/>
           </a:p>
@@ -19746,7 +20222,7 @@
           <a:p>
             <a:fld id="{02AC24A9-CCB6-4F8D-B8DB-C2F3692CFA5A}" type="datetimeFigureOut">
               <a:rPr lang="en-US" smtClean="0"/>
-              <a:t>6/28/21</a:t>
+              <a:t>6/29/2021</a:t>
             </a:fld>
             <a:endParaRPr lang="en-US"/>
           </a:p>
@@ -20075,7 +20551,7 @@
           <a:p>
             <a:fld id="{02AC24A9-CCB6-4F8D-B8DB-C2F3692CFA5A}" type="datetimeFigureOut">
               <a:rPr lang="en-US" smtClean="0"/>
-              <a:t>6/28/21</a:t>
+              <a:t>6/29/2021</a:t>
             </a:fld>
             <a:endParaRPr lang="en-US"/>
           </a:p>
@@ -20188,7 +20664,7 @@
           <a:p>
             <a:fld id="{02AC24A9-CCB6-4F8D-B8DB-C2F3692CFA5A}" type="datetimeFigureOut">
               <a:rPr lang="en-US" smtClean="0"/>
-              <a:t>6/28/21</a:t>
+              <a:t>6/29/2021</a:t>
             </a:fld>
             <a:endParaRPr lang="en-US"/>
           </a:p>
@@ -20683,7 +21159,7 @@
           <a:p>
             <a:fld id="{02AC24A9-CCB6-4F8D-B8DB-C2F3692CFA5A}" type="datetimeFigureOut">
               <a:rPr lang="en-US" smtClean="0"/>
-              <a:t>6/28/21</a:t>
+              <a:t>6/29/2021</a:t>
             </a:fld>
             <a:endParaRPr lang="en-US"/>
           </a:p>
@@ -21160,7 +21636,7 @@
           <a:p>
             <a:fld id="{02AC24A9-CCB6-4F8D-B8DB-C2F3692CFA5A}" type="datetimeFigureOut">
               <a:rPr lang="en-US" smtClean="0"/>
-              <a:t>6/28/21</a:t>
+              <a:t>6/29/2021</a:t>
             </a:fld>
             <a:endParaRPr lang="en-US"/>
           </a:p>
@@ -21403,7 +21879,7 @@
           <a:p>
             <a:fld id="{02AC24A9-CCB6-4F8D-B8DB-C2F3692CFA5A}" type="datetimeFigureOut">
               <a:rPr lang="en-US" smtClean="0"/>
-              <a:t>6/28/21</a:t>
+              <a:t>6/29/2021</a:t>
             </a:fld>
             <a:endParaRPr lang="en-US"/>
           </a:p>
@@ -24065,7 +24541,7 @@
 </file>
 
 <file path=ppt/slides/slide15.xml><?xml version="1.0" encoding="utf-8"?>
-<p:sld xmlns:a="http://schemas.openxmlformats.org/drawingml/2006/main" xmlns:r="http://schemas.openxmlformats.org/officeDocument/2006/relationships" xmlns:p="http://schemas.openxmlformats.org/presentationml/2006/main">
+<p:sld xmlns:a="http://schemas.openxmlformats.org/drawingml/2006/main" xmlns:r="http://schemas.openxmlformats.org/officeDocument/2006/relationships" xmlns:p="http://schemas.openxmlformats.org/presentationml/2006/main" show="0">
   <p:cSld>
     <p:spTree>
       <p:nvGrpSpPr>
@@ -25147,31 +25623,64 @@
           </a:p>
         </p:txBody>
       </p:sp>
-      <p:sp>
-        <p:nvSpPr>
-          <p:cNvPr id="3" name="Espaço Reservado para Conteúdo 2">
+      <p:pic>
+        <p:nvPicPr>
+          <p:cNvPr id="7" name="Imagem 6">
             <a:extLst>
               <a:ext uri="{FF2B5EF4-FFF2-40B4-BE49-F238E27FC236}">
-                <a16:creationId xmlns:a16="http://schemas.microsoft.com/office/drawing/2014/main" id="{CBE52EC6-5655-AC41-BFC6-219A701838F1}"/>
+                <a16:creationId xmlns:a16="http://schemas.microsoft.com/office/drawing/2014/main" id="{3EF9CF5C-973E-4CBC-B5AE-143C2DBA04ED}"/>
               </a:ext>
             </a:extLst>
           </p:cNvPr>
-          <p:cNvSpPr>
-            <a:spLocks noGrp="1"/>
-          </p:cNvSpPr>
-          <p:nvPr>
-            <p:ph idx="1"/>
-          </p:nvPr>
-        </p:nvSpPr>
-        <p:spPr/>
-        <p:txBody>
-          <a:bodyPr/>
-          <a:lstStyle/>
-          <a:p>
-            <a:endParaRPr lang="pt-BR"/>
-          </a:p>
-        </p:txBody>
-      </p:sp>
+          <p:cNvPicPr>
+            <a:picLocks noChangeAspect="1"/>
+          </p:cNvPicPr>
+          <p:nvPr/>
+        </p:nvPicPr>
+        <p:blipFill rotWithShape="1">
+          <a:blip r:embed="rId3"/>
+          <a:srcRect r="47013"/>
+          <a:stretch/>
+        </p:blipFill>
+        <p:spPr>
+          <a:xfrm>
+            <a:off x="1115568" y="2751156"/>
+            <a:ext cx="10165214" cy="1376562"/>
+          </a:xfrm>
+          <a:prstGeom prst="rect">
+            <a:avLst/>
+          </a:prstGeom>
+        </p:spPr>
+      </p:pic>
+      <p:pic>
+        <p:nvPicPr>
+          <p:cNvPr id="8" name="Imagem 7">
+            <a:extLst>
+              <a:ext uri="{FF2B5EF4-FFF2-40B4-BE49-F238E27FC236}">
+                <a16:creationId xmlns:a16="http://schemas.microsoft.com/office/drawing/2014/main" id="{8645A8B0-AC6F-4463-BA8A-66482FD96A85}"/>
+              </a:ext>
+            </a:extLst>
+          </p:cNvPr>
+          <p:cNvPicPr>
+            <a:picLocks noChangeAspect="1"/>
+          </p:cNvPicPr>
+          <p:nvPr/>
+        </p:nvPicPr>
+        <p:blipFill rotWithShape="1">
+          <a:blip r:embed="rId3"/>
+          <a:srcRect l="52987"/>
+          <a:stretch/>
+        </p:blipFill>
+        <p:spPr>
+          <a:xfrm>
+            <a:off x="1118482" y="4424668"/>
+            <a:ext cx="10165214" cy="1564607"/>
+          </a:xfrm>
+          <a:prstGeom prst="rect">
+            <a:avLst/>
+          </a:prstGeom>
+        </p:spPr>
+      </p:pic>
     </p:spTree>
     <p:extLst>
       <p:ext uri="{BB962C8B-B14F-4D97-AF65-F5344CB8AC3E}">
@@ -26301,7 +26810,7 @@
 </file>
 
 <file path=ppt/slides/slide20.xml><?xml version="1.0" encoding="utf-8"?>
-<p:sld xmlns:a="http://schemas.openxmlformats.org/drawingml/2006/main" xmlns:r="http://schemas.openxmlformats.org/officeDocument/2006/relationships" xmlns:p="http://schemas.openxmlformats.org/presentationml/2006/main">
+<p:sld xmlns:a="http://schemas.openxmlformats.org/drawingml/2006/main" xmlns:r="http://schemas.openxmlformats.org/officeDocument/2006/relationships" xmlns:p="http://schemas.openxmlformats.org/presentationml/2006/main" show="0">
   <p:cSld>
     <p:spTree>
       <p:nvGrpSpPr>
@@ -26843,7 +27352,7 @@
       </p:grpSpPr>
       <p:sp>
         <p:nvSpPr>
-          <p:cNvPr id="58" name="Rectangle 9">
+          <p:cNvPr id="67" name="Rectangle 66">
             <a:extLst>
               <a:ext uri="{FF2B5EF4-FFF2-40B4-BE49-F238E27FC236}">
                 <a16:creationId xmlns:a16="http://schemas.microsoft.com/office/drawing/2014/main" id="{8D06CE56-3881-4ADA-8CEF-D18B02C242A3}"/>
@@ -26935,7 +27444,7 @@
       </p:sp>
       <p:sp>
         <p:nvSpPr>
-          <p:cNvPr id="59" name="Rectangle 11">
+          <p:cNvPr id="69" name="Rectangle 68">
             <a:extLst>
               <a:ext uri="{FF2B5EF4-FFF2-40B4-BE49-F238E27FC236}">
                 <a16:creationId xmlns:a16="http://schemas.microsoft.com/office/drawing/2014/main" id="{79F3C543-62EC-4433-9C93-A2CD8764E9B4}"/>
@@ -27031,7 +27540,7 @@
       </p:sp>
       <p:sp useBgFill="1">
         <p:nvSpPr>
-          <p:cNvPr id="60" name="Rectangle 13">
+          <p:cNvPr id="71" name="Rectangle 70">
             <a:extLst>
               <a:ext uri="{FF2B5EF4-FFF2-40B4-BE49-F238E27FC236}">
                 <a16:creationId xmlns:a16="http://schemas.microsoft.com/office/drawing/2014/main" id="{96646FC9-C66D-4EC7-8310-0DD4ACC49C6C}"/>
@@ -27091,7 +27600,7 @@
       </p:sp>
       <p:sp useBgFill="1">
         <p:nvSpPr>
-          <p:cNvPr id="61" name="Rectangle 15">
+          <p:cNvPr id="73" name="Rectangle 72">
             <a:extLst>
               <a:ext uri="{FF2B5EF4-FFF2-40B4-BE49-F238E27FC236}">
                 <a16:creationId xmlns:a16="http://schemas.microsoft.com/office/drawing/2014/main" id="{A3473CF9-37EB-43E7-89EF-D2D1C53D1DAC}"/>
@@ -27229,7 +27738,7 @@
       </p:sp>
       <p:sp>
         <p:nvSpPr>
-          <p:cNvPr id="62" name="Rectangle: Rounded Corners 17">
+          <p:cNvPr id="75" name="Rectangle: Rounded Corners 74">
             <a:extLst>
               <a:ext uri="{FF2B5EF4-FFF2-40B4-BE49-F238E27FC236}">
                 <a16:creationId xmlns:a16="http://schemas.microsoft.com/office/drawing/2014/main" id="{586B4EF9-43BA-4655-A6FF-1D8E21574C95}"/>
@@ -27323,10 +27832,10 @@
       </p:sp>
       <p:pic>
         <p:nvPicPr>
-          <p:cNvPr id="4" name="Imagem 3">
+          <p:cNvPr id="6" name="Imagem 5" descr="Texto&#10;&#10;Descrição gerada automaticamente">
             <a:extLst>
               <a:ext uri="{FF2B5EF4-FFF2-40B4-BE49-F238E27FC236}">
-                <a16:creationId xmlns:a16="http://schemas.microsoft.com/office/drawing/2014/main" id="{EF0CCF47-9089-5D41-A3D3-5C44F3D0F5E8}"/>
+                <a16:creationId xmlns:a16="http://schemas.microsoft.com/office/drawing/2014/main" id="{E706A626-ED17-4E8D-A497-09CD0CC70DE2}"/>
               </a:ext>
             </a:extLst>
           </p:cNvPr>
@@ -27335,16 +27844,15 @@
           </p:cNvPicPr>
           <p:nvPr/>
         </p:nvPicPr>
-        <p:blipFill>
+        <p:blipFill rotWithShape="1">
           <a:blip r:embed="rId2"/>
-          <a:stretch>
-            <a:fillRect/>
-          </a:stretch>
+          <a:srcRect t="31394" r="64459"/>
+          <a:stretch/>
         </p:blipFill>
         <p:spPr>
           <a:xfrm>
-            <a:off x="1088233" y="2139484"/>
-            <a:ext cx="4190805" cy="4096512"/>
+            <a:off x="1623212" y="2139484"/>
+            <a:ext cx="3120848" cy="4096512"/>
           </a:xfrm>
           <a:prstGeom prst="rect">
             <a:avLst/>
@@ -27353,7 +27861,7 @@
       </p:pic>
       <p:pic>
         <p:nvPicPr>
-          <p:cNvPr id="5" name="Imagem 4">
+          <p:cNvPr id="5" name="Imagem 4" descr="Texto&#10;&#10;Descrição gerada automaticamente">
             <a:extLst>
               <a:ext uri="{FF2B5EF4-FFF2-40B4-BE49-F238E27FC236}">
                 <a16:creationId xmlns:a16="http://schemas.microsoft.com/office/drawing/2014/main" id="{FB3A5CB2-139B-9348-B30D-293CC97FE5EA}"/>
@@ -28434,7 +28942,7 @@
       </p:grpSpPr>
       <p:sp>
         <p:nvSpPr>
-          <p:cNvPr id="36" name="Rectangle 11">
+          <p:cNvPr id="45" name="Rectangle 44">
             <a:extLst>
               <a:ext uri="{FF2B5EF4-FFF2-40B4-BE49-F238E27FC236}">
                 <a16:creationId xmlns:a16="http://schemas.microsoft.com/office/drawing/2014/main" id="{8D06CE56-3881-4ADA-8CEF-D18B02C242A3}"/>
@@ -28526,7 +29034,7 @@
       </p:sp>
       <p:sp>
         <p:nvSpPr>
-          <p:cNvPr id="37" name="Rectangle 13">
+          <p:cNvPr id="47" name="Rectangle 46">
             <a:extLst>
               <a:ext uri="{FF2B5EF4-FFF2-40B4-BE49-F238E27FC236}">
                 <a16:creationId xmlns:a16="http://schemas.microsoft.com/office/drawing/2014/main" id="{79F3C543-62EC-4433-9C93-A2CD8764E9B4}"/>
@@ -28622,10 +29130,10 @@
       </p:sp>
       <p:sp useBgFill="1">
         <p:nvSpPr>
-          <p:cNvPr id="38" name="Rectangle 15">
+          <p:cNvPr id="49" name="Rectangle 48">
             <a:extLst>
               <a:ext uri="{FF2B5EF4-FFF2-40B4-BE49-F238E27FC236}">
-                <a16:creationId xmlns:a16="http://schemas.microsoft.com/office/drawing/2014/main" id="{0E2F58BF-12E5-4B5A-AD25-4DAAA2742A7B}"/>
+                <a16:creationId xmlns:a16="http://schemas.microsoft.com/office/drawing/2014/main" id="{68AF5748-FED8-45BA-8631-26D1D10F3246}"/>
               </a:ext>
               <a:ext uri="{C183D7F6-B498-43B3-948B-1728B52AA6E4}">
                 <adec:decorative xmlns:adec="http://schemas.microsoft.com/office/drawing/2017/decorative" val="1"/>
@@ -28717,7 +29225,7 @@
       </p:sp>
       <p:sp>
         <p:nvSpPr>
-          <p:cNvPr id="39" name="!!accent">
+          <p:cNvPr id="51" name="Rectangle 50">
             <a:extLst>
               <a:ext uri="{FF2B5EF4-FFF2-40B4-BE49-F238E27FC236}">
                 <a16:creationId xmlns:a16="http://schemas.microsoft.com/office/drawing/2014/main" id="{AF2F604E-43BE-4DC3-B983-E071523364F8}"/>
@@ -28809,7 +29317,7 @@
       </p:sp>
       <p:sp>
         <p:nvSpPr>
-          <p:cNvPr id="40" name="Rectangle 19">
+          <p:cNvPr id="53" name="Rectangle 52">
             <a:extLst>
               <a:ext uri="{FF2B5EF4-FFF2-40B4-BE49-F238E27FC236}">
                 <a16:creationId xmlns:a16="http://schemas.microsoft.com/office/drawing/2014/main" id="{08C9B587-E65E-4B52-B37C-ABEBB6E87928}"/>
@@ -28845,12 +29353,7 @@
             </a:schemeClr>
           </a:solidFill>
           <a:ln w="3175">
-            <a:solidFill>
-              <a:schemeClr val="tx2">
-                <a:lumMod val="25000"/>
-                <a:lumOff val="75000"/>
-              </a:schemeClr>
-            </a:solidFill>
+            <a:noFill/>
           </a:ln>
           <a:effectLst/>
         </p:spPr>
@@ -28910,10 +29413,10 @@
       </p:sp>
       <p:pic>
         <p:nvPicPr>
-          <p:cNvPr id="7" name="Imagem 6" descr="Gráfico, Gráfico de pizza&#10;&#10;Descrição gerada automaticamente">
+          <p:cNvPr id="3" name="Imagem 2">
             <a:extLst>
               <a:ext uri="{FF2B5EF4-FFF2-40B4-BE49-F238E27FC236}">
-                <a16:creationId xmlns:a16="http://schemas.microsoft.com/office/drawing/2014/main" id="{CD5478AB-3DD2-DA43-A235-A273C09A2C88}"/>
+                <a16:creationId xmlns:a16="http://schemas.microsoft.com/office/drawing/2014/main" id="{5B3253A5-ED55-441D-B5DE-2A96B16EF18E}"/>
               </a:ext>
             </a:extLst>
           </p:cNvPr>
@@ -28922,15 +29425,16 @@
           </p:cNvPicPr>
           <p:nvPr/>
         </p:nvPicPr>
-        <p:blipFill rotWithShape="1">
+        <p:blipFill>
           <a:blip r:embed="rId3"/>
-          <a:srcRect l="17263" r="17329" b="1"/>
-          <a:stretch/>
+          <a:stretch>
+            <a:fillRect/>
+          </a:stretch>
         </p:blipFill>
         <p:spPr>
           <a:xfrm>
-            <a:off x="4868487" y="10"/>
-            <a:ext cx="7323513" cy="6857990"/>
+            <a:off x="4864608" y="743197"/>
+            <a:ext cx="6846363" cy="5220352"/>
           </a:xfrm>
           <a:prstGeom prst="rect">
             <a:avLst/>
@@ -29345,12 +29849,8 @@
               <a:buNone/>
             </a:pPr>
             <a:r>
-              <a:rPr lang="pt-BR" sz="1400" dirty="0" err="1"/>
-              <a:t>Apps</a:t>
-            </a:r>
-            <a:r>
               <a:rPr lang="pt-BR" sz="1400" dirty="0"/>
-              <a:t> Open </a:t>
+              <a:t>Apps Open </a:t>
             </a:r>
             <a:r>
               <a:rPr lang="pt-BR" sz="1400" dirty="0" err="1"/>
@@ -29362,7 +29862,7 @@
             </a:r>
             <a:r>
               <a:rPr lang="pt-BR" sz="1400" b="1" dirty="0"/>
-              <a:t>955</a:t>
+              <a:t>674</a:t>
             </a:r>
           </a:p>
           <a:p>
@@ -29394,7 +29894,7 @@
             </a:r>
             <a:r>
               <a:rPr lang="pt-BR" sz="1400" b="1" dirty="0"/>
-              <a:t>40</a:t>
+              <a:t>64</a:t>
             </a:r>
           </a:p>
           <a:p>
@@ -29438,7 +29938,7 @@
             </a:r>
             <a:r>
               <a:rPr lang="pt-BR" sz="1400" b="1" dirty="0"/>
-              <a:t>7</a:t>
+              <a:t>5</a:t>
             </a:r>
             <a:r>
               <a:rPr lang="pt-BR" sz="1400" dirty="0"/>
@@ -29470,15 +29970,15 @@
             </a:r>
             <a:r>
               <a:rPr lang="pt-BR" sz="1400" b="1" dirty="0"/>
-              <a:t>1</a:t>
+              <a:t>2 </a:t>
             </a:r>
             <a:r>
               <a:rPr lang="pt-BR" sz="1400" dirty="0"/>
-              <a:t> (</a:t>
+              <a:t>(</a:t>
             </a:r>
             <a:r>
               <a:rPr lang="pt-BR" sz="1400" dirty="0" err="1"/>
-              <a:t>Very</a:t>
+              <a:t>Fairly</a:t>
             </a:r>
             <a:r>
               <a:rPr lang="pt-BR" sz="1400" dirty="0"/>
@@ -29486,7 +29986,7 @@
             </a:r>
             <a:r>
               <a:rPr lang="pt-BR" sz="1400" dirty="0" err="1"/>
-              <a:t>Good</a:t>
+              <a:t>good</a:t>
             </a:r>
             <a:r>
               <a:rPr lang="pt-BR" sz="1400" dirty="0"/>
@@ -29554,7 +30054,7 @@
             </a:r>
             <a:r>
               <a:rPr lang="pt-BR" sz="1400" b="1" dirty="0"/>
-              <a:t>18</a:t>
+              <a:t>24</a:t>
             </a:r>
             <a:r>
               <a:rPr lang="pt-BR" sz="1400" dirty="0"/>
@@ -29562,7 +30062,7 @@
             </a:r>
             <a:r>
               <a:rPr lang="pt-BR" sz="1400" dirty="0" err="1"/>
-              <a:t>Moderately</a:t>
+              <a:t>Severe</a:t>
             </a:r>
             <a:r>
               <a:rPr lang="pt-BR" sz="1400" dirty="0"/>
@@ -29570,7 +30070,7 @@
             </a:r>
             <a:r>
               <a:rPr lang="pt-BR" sz="1400" dirty="0" err="1"/>
-              <a:t>Severe</a:t>
+              <a:t>Depression</a:t>
             </a:r>
             <a:r>
               <a:rPr lang="pt-BR" sz="1400" dirty="0"/>
@@ -29585,24 +30085,20 @@
               <a:buNone/>
             </a:pPr>
             <a:r>
+              <a:rPr lang="pt-BR" sz="1400" dirty="0"/>
+              <a:t>PSS: </a:t>
+            </a:r>
+            <a:r>
+              <a:rPr lang="pt-BR" sz="1400" b="1" dirty="0"/>
+              <a:t>32</a:t>
+            </a:r>
+            <a:r>
+              <a:rPr lang="pt-BR" sz="1400" dirty="0"/>
+              <a:t> (High </a:t>
+            </a:r>
+            <a:r>
               <a:rPr lang="pt-BR" sz="1400" dirty="0" err="1"/>
               <a:t>Perceived</a:t>
-            </a:r>
-            <a:r>
-              <a:rPr lang="pt-BR" sz="1400" dirty="0"/>
-              <a:t> Stress Scale: </a:t>
-            </a:r>
-            <a:r>
-              <a:rPr lang="pt-BR" sz="1400" b="1" dirty="0"/>
-              <a:t>12</a:t>
-            </a:r>
-            <a:r>
-              <a:rPr lang="pt-BR" sz="1400" dirty="0"/>
-              <a:t> (</a:t>
-            </a:r>
-            <a:r>
-              <a:rPr lang="pt-BR" sz="1400" dirty="0" err="1"/>
-              <a:t>Low</a:t>
             </a:r>
             <a:r>
               <a:rPr lang="pt-BR" sz="1400" dirty="0"/>
@@ -29853,22 +30349,12 @@
               <a:lnSpc>
                 <a:spcPct val="100000"/>
               </a:lnSpc>
-              <a:buFont typeface="Arial" panose="020B0604020202020204" pitchFamily="34" charset="0"/>
               <a:buNone/>
             </a:pPr>
             <a:r>
               <a:rPr lang="pt-BR" sz="1600" dirty="0"/>
-              <a:t>1edff768-5466-42b7-86d3-539556887683</a:t>
-            </a:r>
-          </a:p>
-          <a:p>
-            <a:pPr marL="0" indent="0">
-              <a:lnSpc>
-                <a:spcPct val="100000"/>
-              </a:lnSpc>
-              <a:buFont typeface="Arial" panose="020B0604020202020204" pitchFamily="34" charset="0"/>
-              <a:buNone/>
-            </a:pPr>
+              <a:t> 478dc69a-833a-42a9-84b3-16fff4b93bfb</a:t>
+            </a:r>
             <a:endParaRPr lang="pt-BR" sz="1400" dirty="0"/>
           </a:p>
         </p:txBody>
@@ -29913,7 +30399,7 @@
       </p:grpSpPr>
       <p:sp useBgFill="1">
         <p:nvSpPr>
-          <p:cNvPr id="38" name="Rectangle 36">
+          <p:cNvPr id="51" name="Rectangle 50">
             <a:extLst>
               <a:ext uri="{FF2B5EF4-FFF2-40B4-BE49-F238E27FC236}">
                 <a16:creationId xmlns:a16="http://schemas.microsoft.com/office/drawing/2014/main" id="{726908CC-6AC4-4222-8250-B90B6072E8AC}"/>
@@ -29973,7 +30459,7 @@
       </p:sp>
       <p:sp>
         <p:nvSpPr>
-          <p:cNvPr id="45" name="Rectangle 38">
+          <p:cNvPr id="53" name="Rectangle 52">
             <a:extLst>
               <a:ext uri="{FF2B5EF4-FFF2-40B4-BE49-F238E27FC236}">
                 <a16:creationId xmlns:a16="http://schemas.microsoft.com/office/drawing/2014/main" id="{F2F606D8-696E-4B76-BB10-43672AA1475A}"/>
@@ -30076,9 +30562,38 @@
           </a:p>
         </p:txBody>
       </p:sp>
+      <p:pic>
+        <p:nvPicPr>
+          <p:cNvPr id="2" name="Imagem 1" descr="Gráfico, Gráfico de barras&#10;&#10;Descrição gerada automaticamente">
+            <a:extLst>
+              <a:ext uri="{FF2B5EF4-FFF2-40B4-BE49-F238E27FC236}">
+                <a16:creationId xmlns:a16="http://schemas.microsoft.com/office/drawing/2014/main" id="{CA64FD52-1643-4AB1-8025-9631C9AE238E}"/>
+              </a:ext>
+            </a:extLst>
+          </p:cNvPr>
+          <p:cNvPicPr>
+            <a:picLocks noChangeAspect="1"/>
+          </p:cNvPicPr>
+          <p:nvPr/>
+        </p:nvPicPr>
+        <p:blipFill rotWithShape="1">
+          <a:blip r:embed="rId3"/>
+          <a:srcRect r="9403"/>
+          <a:stretch/>
+        </p:blipFill>
+        <p:spPr>
+          <a:xfrm>
+            <a:off x="352751" y="302429"/>
+            <a:ext cx="11550506" cy="6053920"/>
+          </a:xfrm>
+          <a:prstGeom prst="rect">
+            <a:avLst/>
+          </a:prstGeom>
+        </p:spPr>
+      </p:pic>
       <p:sp>
         <p:nvSpPr>
-          <p:cNvPr id="46" name="Rectangle 40">
+          <p:cNvPr id="55" name="Rectangle 54">
             <a:extLst>
               <a:ext uri="{FF2B5EF4-FFF2-40B4-BE49-F238E27FC236}">
                 <a16:creationId xmlns:a16="http://schemas.microsoft.com/office/drawing/2014/main" id="{3ABF1881-5AFD-48F9-979A-19EE2FE30A33}"/>
@@ -30168,36 +30683,6 @@
           </a:p>
         </p:txBody>
       </p:sp>
-      <p:pic>
-        <p:nvPicPr>
-          <p:cNvPr id="48" name="Imagem 47" descr="Gráfico, Gráfico de barras&#10;&#10;Descrição gerada automaticamente">
-            <a:extLst>
-              <a:ext uri="{FF2B5EF4-FFF2-40B4-BE49-F238E27FC236}">
-                <a16:creationId xmlns:a16="http://schemas.microsoft.com/office/drawing/2014/main" id="{756B6ED1-269A-0148-807E-255F1FC6E6BD}"/>
-              </a:ext>
-            </a:extLst>
-          </p:cNvPr>
-          <p:cNvPicPr>
-            <a:picLocks noChangeAspect="1"/>
-          </p:cNvPicPr>
-          <p:nvPr/>
-        </p:nvPicPr>
-        <p:blipFill>
-          <a:blip r:embed="rId3"/>
-          <a:stretch>
-            <a:fillRect/>
-          </a:stretch>
-        </p:blipFill>
-        <p:spPr>
-          <a:xfrm>
-            <a:off x="1670050" y="184150"/>
-            <a:ext cx="8851900" cy="6489700"/>
-          </a:xfrm>
-          <a:prstGeom prst="rect">
-            <a:avLst/>
-          </a:prstGeom>
-        </p:spPr>
-      </p:pic>
     </p:spTree>
     <p:extLst>
       <p:ext uri="{BB962C8B-B14F-4D97-AF65-F5344CB8AC3E}">

</xml_diff>